<commit_message>
Uplaod gitignore files, modify progress report slide
Signed-off-by: yaannnik <yaannnikk@gmail.com>
</commit_message>
<xml_diff>
--- a/Progress presentation#3.pptx
+++ b/Progress presentation#3.pptx
@@ -16,6 +16,7 @@
     <p:sldId id="258" r:id="rId9"/>
     <p:sldId id="272" r:id="rId10"/>
     <p:sldId id="268" r:id="rId11"/>
+    <p:sldId id="275" r:id="rId12"/>
   </p:sldIdLst>
   <p:sldSz cx="9144000" cy="5143500"/>
   <p:notesSz cx="6858000" cy="9144000"/>
@@ -2134,6 +2135,105 @@
 </file>
 
 <file path=ppt/notesSlides/notesSlide8.xml><?xml version="1.0" encoding="utf-8"?>
+<p:notes xmlns:a="http://schemas.openxmlformats.org/drawingml/2006/main" xmlns:r="http://schemas.openxmlformats.org/officeDocument/2006/relationships" xmlns:p="http://schemas.openxmlformats.org/presentationml/2006/main" showMasterPhAnim="0" showMasterSp="0">
+  <p:cSld>
+    <p:spTree>
+      <p:nvGrpSpPr>
+        <p:cNvPr id="237" name="Shape 237"/>
+        <p:cNvGrpSpPr/>
+        <p:nvPr/>
+      </p:nvGrpSpPr>
+      <p:grpSpPr>
+        <a:xfrm>
+          <a:off x="0" y="0"/>
+          <a:ext cx="0" cy="0"/>
+          <a:chOff x="0" y="0"/>
+          <a:chExt cx="0" cy="0"/>
+        </a:xfrm>
+      </p:grpSpPr>
+      <p:sp>
+        <p:nvSpPr>
+          <p:cNvPr id="238" name="Google Shape;238;p12:notes"/>
+          <p:cNvSpPr txBox="1"/>
+          <p:nvPr>
+            <p:ph type="body" idx="1"/>
+          </p:nvPr>
+        </p:nvSpPr>
+        <p:spPr>
+          <a:xfrm>
+            <a:off x="685800" y="4400550"/>
+            <a:ext cx="5486400" cy="3600450"/>
+          </a:xfrm>
+          <a:prstGeom prst="rect">
+            <a:avLst/>
+          </a:prstGeom>
+        </p:spPr>
+        <p:txBody>
+          <a:bodyPr spcFirstLastPara="1" wrap="square" lIns="91425" tIns="45700" rIns="91425" bIns="45700" anchor="t" anchorCtr="0">
+            <a:noAutofit/>
+          </a:bodyPr>
+          <a:lstStyle/>
+          <a:p>
+            <a:pPr marL="0" lvl="0" indent="0" algn="l" rtl="0">
+              <a:spcBef>
+                <a:spcPts val="0"/>
+              </a:spcBef>
+              <a:spcAft>
+                <a:spcPts val="0"/>
+              </a:spcAft>
+              <a:buNone/>
+            </a:pPr>
+          </a:p>
+        </p:txBody>
+      </p:sp>
+      <p:sp>
+        <p:nvSpPr>
+          <p:cNvPr id="239" name="Google Shape;239;p12:notes"/>
+          <p:cNvSpPr/>
+          <p:nvPr>
+            <p:ph type="sldImg" idx="2"/>
+          </p:nvPr>
+        </p:nvSpPr>
+        <p:spPr>
+          <a:xfrm>
+            <a:off x="685800" y="1143000"/>
+            <a:ext cx="5486400" cy="3086100"/>
+          </a:xfrm>
+          <a:custGeom>
+            <a:avLst/>
+            <a:gdLst/>
+            <a:ahLst/>
+            <a:cxnLst/>
+            <a:rect l="l" t="t" r="r" b="b"/>
+            <a:pathLst>
+              <a:path w="120000" h="120000" extrusionOk="0">
+                <a:moveTo>
+                  <a:pt x="0" y="0"/>
+                </a:moveTo>
+                <a:lnTo>
+                  <a:pt x="120000" y="0"/>
+                </a:lnTo>
+                <a:lnTo>
+                  <a:pt x="120000" y="120000"/>
+                </a:lnTo>
+                <a:lnTo>
+                  <a:pt x="0" y="120000"/>
+                </a:lnTo>
+                <a:close/>
+              </a:path>
+            </a:pathLst>
+          </a:custGeom>
+        </p:spPr>
+      </p:sp>
+    </p:spTree>
+  </p:cSld>
+  <p:clrMapOvr>
+    <a:masterClrMapping/>
+  </p:clrMapOvr>
+</p:notes>
+</file>
+
+<file path=ppt/notesSlides/notesSlide9.xml><?xml version="1.0" encoding="utf-8"?>
 <p:notes xmlns:a="http://schemas.openxmlformats.org/drawingml/2006/main" xmlns:r="http://schemas.openxmlformats.org/officeDocument/2006/relationships" xmlns:p="http://schemas.openxmlformats.org/presentationml/2006/main" showMasterPhAnim="0" showMasterSp="0">
   <p:cSld>
     <p:spTree>
@@ -8509,7 +8609,7 @@
             </a:pPr>
             <a:r>
               <a:rPr lang="en-US" altLang="zh-CN" sz="1200"/>
-              <a:t>Implemented our experiments in PyTorch and visualize via OpenCV</a:t>
+              <a:t>Implement our experiments in PyTorch and visualize via OpenCV</a:t>
             </a:r>
             <a:endParaRPr lang="en-US" altLang="zh-CN" sz="1200"/>
           </a:p>
@@ -9595,6 +9695,35 @@
           </a:p>
         </p:txBody>
       </p:sp>
+      <p:sp>
+        <p:nvSpPr>
+          <p:cNvPr id="8" name="文本框 7"/>
+          <p:cNvSpPr txBox="1"/>
+          <p:nvPr/>
+        </p:nvSpPr>
+        <p:spPr>
+          <a:xfrm>
+            <a:off x="6438265" y="1623060"/>
+            <a:ext cx="2429510" cy="953135"/>
+          </a:xfrm>
+          <a:prstGeom prst="rect">
+            <a:avLst/>
+          </a:prstGeom>
+          <a:noFill/>
+        </p:spPr>
+        <p:txBody>
+          <a:bodyPr wrap="square" rtlCol="0">
+            <a:spAutoFit/>
+          </a:bodyPr>
+          <a:p>
+            <a:r>
+              <a:rPr lang="en-US" altLang="zh-CN"/>
+              <a:t>All training is done on GCP with one Tesla T4 GPU. Finished 20000 iterations in approximately 2 hours.</a:t>
+            </a:r>
+            <a:endParaRPr lang="en-US" altLang="zh-CN"/>
+          </a:p>
+        </p:txBody>
+      </p:sp>
     </p:spTree>
   </p:cSld>
   <p:clrMapOvr>
@@ -11074,6 +11203,263 @@
             <a:r>
               <a:rPr lang="en-US" sz="1600"/>
               <a:t>Optimization of the front-end UI</a:t>
+            </a:r>
+            <a:endParaRPr lang="en-US" sz="1600"/>
+          </a:p>
+          <a:p>
+            <a:pPr marL="0" lvl="0" indent="0" algn="l" rtl="0">
+              <a:lnSpc>
+                <a:spcPct val="115000"/>
+              </a:lnSpc>
+              <a:spcBef>
+                <a:spcPts val="0"/>
+              </a:spcBef>
+              <a:spcAft>
+                <a:spcPts val="0"/>
+              </a:spcAft>
+              <a:buNone/>
+            </a:pPr>
+            <a:endParaRPr sz="1800"/>
+          </a:p>
+        </p:txBody>
+      </p:sp>
+    </p:spTree>
+  </p:cSld>
+  <p:clrMapOvr>
+    <a:masterClrMapping/>
+  </p:clrMapOvr>
+</p:sld>
+</file>
+
+<file path=ppt/slides/slide9.xml><?xml version="1.0" encoding="utf-8"?>
+<p:sld xmlns:a="http://schemas.openxmlformats.org/drawingml/2006/main" xmlns:r="http://schemas.openxmlformats.org/officeDocument/2006/relationships" xmlns:p="http://schemas.openxmlformats.org/presentationml/2006/main">
+  <p:cSld>
+    <p:spTree>
+      <p:nvGrpSpPr>
+        <p:cNvPr id="240" name="Shape 240"/>
+        <p:cNvGrpSpPr/>
+        <p:nvPr/>
+      </p:nvGrpSpPr>
+      <p:grpSpPr>
+        <a:xfrm>
+          <a:off x="0" y="0"/>
+          <a:ext cx="0" cy="0"/>
+          <a:chOff x="0" y="0"/>
+          <a:chExt cx="0" cy="0"/>
+        </a:xfrm>
+      </p:grpSpPr>
+      <p:grpSp>
+        <p:nvGrpSpPr>
+          <p:cNvPr id="242" name="Google Shape;242;p26"/>
+          <p:cNvGrpSpPr/>
+          <p:nvPr/>
+        </p:nvGrpSpPr>
+        <p:grpSpPr>
+          <a:xfrm>
+            <a:off x="-150" y="4761900"/>
+            <a:ext cx="9144000" cy="381600"/>
+            <a:chOff x="-150" y="4761900"/>
+            <a:chExt cx="9144000" cy="381600"/>
+          </a:xfrm>
+        </p:grpSpPr>
+        <p:sp>
+          <p:nvSpPr>
+            <p:cNvPr id="243" name="Google Shape;243;p26"/>
+            <p:cNvSpPr/>
+            <p:nvPr/>
+          </p:nvSpPr>
+          <p:spPr>
+            <a:xfrm>
+              <a:off x="-150" y="4761900"/>
+              <a:ext cx="9144000" cy="381600"/>
+            </a:xfrm>
+            <a:prstGeom prst="rect">
+              <a:avLst/>
+            </a:prstGeom>
+            <a:solidFill>
+              <a:srgbClr val="002060"/>
+            </a:solidFill>
+            <a:ln>
+              <a:noFill/>
+            </a:ln>
+          </p:spPr>
+          <p:txBody>
+            <a:bodyPr spcFirstLastPara="1" wrap="square" lIns="91425" tIns="91425" rIns="91425" bIns="91425" anchor="ctr" anchorCtr="0">
+              <a:noAutofit/>
+            </a:bodyPr>
+            <a:lstStyle/>
+            <a:p>
+              <a:pPr marL="0" lvl="0" indent="0" algn="l" rtl="0">
+                <a:spcBef>
+                  <a:spcPts val="0"/>
+                </a:spcBef>
+                <a:spcAft>
+                  <a:spcPts val="0"/>
+                </a:spcAft>
+                <a:buNone/>
+              </a:pPr>
+            </a:p>
+          </p:txBody>
+        </p:sp>
+        <p:pic>
+          <p:nvPicPr>
+            <p:cNvPr id="244" name="Google Shape;244;p26"/>
+            <p:cNvPicPr preferRelativeResize="0"/>
+            <p:nvPr/>
+          </p:nvPicPr>
+          <p:blipFill>
+            <a:blip r:embed="rId1"/>
+            <a:stretch>
+              <a:fillRect/>
+            </a:stretch>
+          </p:blipFill>
+          <p:spPr>
+            <a:xfrm>
+              <a:off x="84625" y="4830825"/>
+              <a:ext cx="1997205" cy="243750"/>
+            </a:xfrm>
+            <a:prstGeom prst="rect">
+              <a:avLst/>
+            </a:prstGeom>
+            <a:noFill/>
+            <a:ln>
+              <a:noFill/>
+            </a:ln>
+          </p:spPr>
+        </p:pic>
+      </p:grpSp>
+      <p:sp>
+        <p:nvSpPr>
+          <p:cNvPr id="245" name="Google Shape;245;p26"/>
+          <p:cNvSpPr txBox="1"/>
+          <p:nvPr>
+            <p:ph type="title"/>
+          </p:nvPr>
+        </p:nvSpPr>
+        <p:spPr>
+          <a:xfrm>
+            <a:off x="247675" y="0"/>
+            <a:ext cx="4075200" cy="692400"/>
+          </a:xfrm>
+          <a:prstGeom prst="rect">
+            <a:avLst/>
+          </a:prstGeom>
+          <a:noFill/>
+          <a:ln>
+            <a:noFill/>
+          </a:ln>
+        </p:spPr>
+        <p:txBody>
+          <a:bodyPr spcFirstLastPara="1" wrap="square" lIns="91425" tIns="45700" rIns="91425" bIns="45700" anchor="b" anchorCtr="0">
+            <a:noAutofit/>
+          </a:bodyPr>
+          <a:lstStyle/>
+          <a:p>
+            <a:pPr marL="0" lvl="0" indent="0" algn="l" rtl="0">
+              <a:lnSpc>
+                <a:spcPct val="100000"/>
+              </a:lnSpc>
+              <a:spcBef>
+                <a:spcPts val="0"/>
+              </a:spcBef>
+              <a:spcAft>
+                <a:spcPts val="0"/>
+              </a:spcAft>
+              <a:buClr>
+                <a:schemeClr val="dk1"/>
+              </a:buClr>
+              <a:buSzPts val="4400"/>
+              <a:buFont typeface="DecoType Naskh" panose="00000400000000000000"/>
+              <a:buNone/>
+            </a:pPr>
+            <a:r>
+              <a:rPr lang="en-US" sz="3000"/>
+              <a:t>Reference</a:t>
+            </a:r>
+            <a:endParaRPr sz="3000"/>
+          </a:p>
+        </p:txBody>
+      </p:sp>
+      <p:sp>
+        <p:nvSpPr>
+          <p:cNvPr id="87" name="Google Shape;87;p16"/>
+          <p:cNvSpPr txBox="1"/>
+          <p:nvPr/>
+        </p:nvSpPr>
+        <p:spPr>
+          <a:xfrm>
+            <a:off x="247650" y="692150"/>
+            <a:ext cx="6052820" cy="3966210"/>
+          </a:xfrm>
+          <a:prstGeom prst="rect">
+            <a:avLst/>
+          </a:prstGeom>
+          <a:noFill/>
+          <a:ln>
+            <a:noFill/>
+          </a:ln>
+        </p:spPr>
+        <p:txBody>
+          <a:bodyPr spcFirstLastPara="1" wrap="square" lIns="91425" tIns="91425" rIns="91425" bIns="91425" anchor="t" anchorCtr="0">
+            <a:noAutofit/>
+          </a:bodyPr>
+          <a:p>
+            <a:pPr marL="457200" lvl="0" indent="-342900" algn="l" rtl="0">
+              <a:lnSpc>
+                <a:spcPct val="115000"/>
+              </a:lnSpc>
+              <a:spcBef>
+                <a:spcPts val="0"/>
+              </a:spcBef>
+              <a:spcAft>
+                <a:spcPts val="0"/>
+              </a:spcAft>
+              <a:buSzPts val="1800"/>
+              <a:buChar char="●"/>
+            </a:pPr>
+            <a:r>
+              <a:rPr lang="en-US" sz="1600"/>
+              <a:t>Ren S, He K, Girshick R, et al. Faster r-cnn: Towards real-time object detection with region proposal networks[J]. Advances in neural information processing systems, 2015, 28: 91-99.</a:t>
+            </a:r>
+            <a:endParaRPr lang="en-US" sz="1600"/>
+          </a:p>
+          <a:p>
+            <a:pPr marL="457200" lvl="0" indent="-342900" algn="l" rtl="0">
+              <a:lnSpc>
+                <a:spcPct val="115000"/>
+              </a:lnSpc>
+              <a:spcBef>
+                <a:spcPts val="0"/>
+              </a:spcBef>
+              <a:spcAft>
+                <a:spcPts val="0"/>
+              </a:spcAft>
+              <a:buSzPts val="1800"/>
+              <a:buChar char="●"/>
+            </a:pPr>
+            <a:r>
+              <a:rPr lang="en-US" sz="1600"/>
+              <a:t>He, Kaiming, et al. "Deep residual learning for image recognition." Proceedings of the IEEE conference on computer vision and pattern recognition. 2016.</a:t>
+            </a:r>
+            <a:endParaRPr lang="en-US" sz="1600"/>
+          </a:p>
+          <a:p>
+            <a:pPr marL="457200" lvl="0" indent="-342900" algn="l" rtl="0">
+              <a:lnSpc>
+                <a:spcPct val="115000"/>
+              </a:lnSpc>
+              <a:spcBef>
+                <a:spcPts val="0"/>
+              </a:spcBef>
+              <a:spcAft>
+                <a:spcPts val="0"/>
+              </a:spcAft>
+              <a:buSzPts val="1800"/>
+              <a:buChar char="●"/>
+            </a:pPr>
+            <a:r>
+              <a:rPr lang="en-US" sz="1600"/>
+              <a:t>Lin T Y, Dollár P, Girshick R, et al. Feature pyramid networks for object detection[C]//Proceedings of the IEEE conference on computer vision and pattern recognition. 2017: 2117-2125.</a:t>
             </a:r>
             <a:endParaRPr lang="en-US" sz="1600"/>
           </a:p>

</xml_diff>

<commit_message>
Modify progress report slide
Signed-off-by: yaannnik <yaannnikk@gmail.com>
</commit_message>
<xml_diff>
--- a/Progress presentation#3.pptx
+++ b/Progress presentation#3.pptx
@@ -8581,7 +8581,7 @@
             </a:pPr>
             <a:r>
               <a:rPr lang="en-US" altLang="zh-CN" sz="1200"/>
-              <a:t>Non-Maximum Supression: Merge candidate region boxes</a:t>
+              <a:t>Non-Maximum Suppression: Merge candidate region boxes</a:t>
             </a:r>
             <a:endParaRPr lang="en-US" altLang="zh-CN" sz="1200"/>
           </a:p>
@@ -9914,7 +9914,7 @@
         <p:spPr>
           <a:xfrm>
             <a:off x="5846445" y="708025"/>
-            <a:ext cx="2924175" cy="2353310"/>
+            <a:ext cx="2924175" cy="2999740"/>
           </a:xfrm>
           <a:prstGeom prst="rect">
             <a:avLst/>
@@ -9935,7 +9935,7 @@
             </a:pPr>
             <a:r>
               <a:rPr lang="en-US" altLang="zh-CN"/>
-              <a:t>Upload your image to be labelled</a:t>
+              <a:t>Upload your image to be labelled through our software user interface.</a:t>
             </a:r>
             <a:endParaRPr lang="en-US" altLang="zh-CN"/>
           </a:p>
@@ -9949,7 +9949,7 @@
             </a:pPr>
             <a:r>
               <a:rPr lang="en-US" altLang="zh-CN"/>
-              <a:t>Wait for annotations generated by our deep-learning model</a:t>
+              <a:t>Wait for annotations generated by our deep-learning model.</a:t>
             </a:r>
             <a:endParaRPr lang="en-US" altLang="zh-CN"/>
           </a:p>
@@ -9963,7 +9963,7 @@
             </a:pPr>
             <a:r>
               <a:rPr lang="en-US" altLang="zh-CN"/>
-              <a:t>Make modifications to achieve a better result</a:t>
+              <a:t>Make modifications to achieve a better result if necessary.</a:t>
             </a:r>
             <a:endParaRPr lang="en-US" altLang="zh-CN"/>
           </a:p>
@@ -9977,7 +9977,7 @@
             </a:pPr>
             <a:r>
               <a:rPr lang="en-US" altLang="zh-CN"/>
-              <a:t>Confirm your labels</a:t>
+              <a:t>Confirm your labels and put it into training dataset.</a:t>
             </a:r>
             <a:endParaRPr lang="en-US" altLang="zh-CN"/>
           </a:p>
@@ -10324,7 +10324,7 @@
                   <a:schemeClr val="dk1"/>
                 </a:solidFill>
               </a:rPr>
-              <a:t>More epoches in the training process</a:t>
+              <a:t>More epochs in the training process</a:t>
             </a:r>
             <a:endParaRPr lang="en-US" sz="1600">
               <a:solidFill>
@@ -10348,7 +10348,7 @@
             </a:pPr>
             <a:r>
               <a:rPr lang="en-US" sz="1600"/>
-              <a:t>Lack of variaty in training dataset</a:t>
+              <a:t>Lack of variety in training dataset</a:t>
             </a:r>
             <a:endParaRPr sz="1600"/>
           </a:p>
@@ -10594,7 +10594,7 @@
         </p:nvSpPr>
         <p:spPr>
           <a:xfrm>
-            <a:off x="247650" y="692150"/>
+            <a:off x="247650" y="588645"/>
             <a:ext cx="6052820" cy="3966210"/>
           </a:xfrm>
           <a:prstGeom prst="rect">
@@ -10645,7 +10645,7 @@
             </a:pPr>
             <a:r>
               <a:rPr lang="en-US" sz="1600"/>
-              <a:t>Performance: AP as the most important criteria</a:t>
+              <a:t>Accuracy: AP as the most important criteria</a:t>
             </a:r>
             <a:endParaRPr sz="1600"/>
           </a:p>
@@ -10687,6 +10687,22 @@
               <a:rPr lang="en-US" sz="1600"/>
               <a:t>Availability: Applicable to different targets and tasks</a:t>
             </a:r>
+            <a:endParaRPr lang="en-US" sz="1600"/>
+          </a:p>
+          <a:p>
+            <a:pPr marL="571500" lvl="1" indent="0" algn="l" rtl="0">
+              <a:lnSpc>
+                <a:spcPct val="115000"/>
+              </a:lnSpc>
+              <a:spcBef>
+                <a:spcPts val="0"/>
+              </a:spcBef>
+              <a:spcAft>
+                <a:spcPts val="0"/>
+              </a:spcAft>
+              <a:buSzPts val="1800"/>
+              <a:buNone/>
+            </a:pPr>
             <a:endParaRPr sz="1600"/>
           </a:p>
           <a:p>
@@ -11047,9 +11063,9 @@
             <a:noAutofit/>
           </a:bodyPr>
           <a:p>
-            <a:pPr marL="457200" lvl="0" indent="-342900" algn="l" rtl="0">
-              <a:lnSpc>
-                <a:spcPct val="115000"/>
+            <a:pPr marL="457200" lvl="0" indent="-342900" algn="l" rtl="0" eaLnBrk="1" fontAlgn="auto" latinLnBrk="0" hangingPunct="1">
+              <a:lnSpc>
+                <a:spcPct val="150000"/>
               </a:lnSpc>
               <a:spcBef>
                 <a:spcPts val="0"/>
@@ -11067,9 +11083,9 @@
             <a:endParaRPr sz="1600"/>
           </a:p>
           <a:p>
-            <a:pPr marL="914400" lvl="1" indent="-342900" algn="l" rtl="0">
-              <a:lnSpc>
-                <a:spcPct val="115000"/>
+            <a:pPr marL="914400" lvl="1" indent="-342900" algn="l" rtl="0" eaLnBrk="1" fontAlgn="auto" latinLnBrk="0" hangingPunct="1">
+              <a:lnSpc>
+                <a:spcPct val="150000"/>
               </a:lnSpc>
               <a:spcBef>
                 <a:spcPts val="0"/>
@@ -11082,14 +11098,14 @@
             </a:pPr>
             <a:r>
               <a:rPr lang="en-US" sz="1600"/>
-              <a:t>Model training interface</a:t>
+              <a:t>Model training function interface</a:t>
             </a:r>
             <a:endParaRPr lang="en-US" sz="1600"/>
           </a:p>
           <a:p>
-            <a:pPr marL="914400" lvl="1" indent="-342900" algn="l" rtl="0">
-              <a:lnSpc>
-                <a:spcPct val="115000"/>
+            <a:pPr marL="914400" lvl="1" indent="-342900" algn="l" rtl="0" eaLnBrk="1" fontAlgn="auto" latinLnBrk="0" hangingPunct="1">
+              <a:lnSpc>
+                <a:spcPct val="150000"/>
               </a:lnSpc>
               <a:spcBef>
                 <a:spcPts val="0"/>
@@ -11102,14 +11118,14 @@
             </a:pPr>
             <a:r>
               <a:rPr lang="en-US" sz="1600"/>
-              <a:t>Parameters adjust for better performance</a:t>
+              <a:t>Parameters tuning for better performance</a:t>
             </a:r>
             <a:endParaRPr lang="en-US" sz="1600"/>
           </a:p>
           <a:p>
-            <a:pPr marL="914400" lvl="1" indent="-342900" algn="l" rtl="0">
-              <a:lnSpc>
-                <a:spcPct val="115000"/>
+            <a:pPr marL="914400" lvl="1" indent="-342900" algn="l" rtl="0" eaLnBrk="1" fontAlgn="auto" latinLnBrk="0" hangingPunct="1">
+              <a:lnSpc>
+                <a:spcPct val="150000"/>
               </a:lnSpc>
               <a:spcBef>
                 <a:spcPts val="0"/>
@@ -11124,12 +11140,28 @@
               <a:rPr lang="en-US" sz="1600"/>
               <a:t>Training dataset variety</a:t>
             </a:r>
+            <a:endParaRPr lang="en-US" sz="1600"/>
+          </a:p>
+          <a:p>
+            <a:pPr marL="571500" lvl="1" indent="0" algn="l" rtl="0" eaLnBrk="1" fontAlgn="auto" latinLnBrk="0" hangingPunct="1">
+              <a:lnSpc>
+                <a:spcPct val="150000"/>
+              </a:lnSpc>
+              <a:spcBef>
+                <a:spcPts val="0"/>
+              </a:spcBef>
+              <a:spcAft>
+                <a:spcPts val="0"/>
+              </a:spcAft>
+              <a:buSzPts val="1800"/>
+              <a:buNone/>
+            </a:pPr>
             <a:endParaRPr sz="1600"/>
           </a:p>
           <a:p>
-            <a:pPr marL="457200" lvl="0" indent="-342900" algn="l" rtl="0">
-              <a:lnSpc>
-                <a:spcPct val="115000"/>
+            <a:pPr marL="457200" lvl="0" indent="-342900" algn="l" rtl="0" eaLnBrk="1" fontAlgn="auto" latinLnBrk="0" hangingPunct="1">
+              <a:lnSpc>
+                <a:spcPct val="150000"/>
               </a:lnSpc>
               <a:spcBef>
                 <a:spcPts val="0"/>
@@ -11147,9 +11179,9 @@
             <a:endParaRPr sz="1600"/>
           </a:p>
           <a:p>
-            <a:pPr marL="914400" lvl="1" indent="-342900" algn="l" rtl="0">
-              <a:lnSpc>
-                <a:spcPct val="115000"/>
+            <a:pPr marL="914400" lvl="1" indent="-342900" algn="l" rtl="0" eaLnBrk="1" fontAlgn="auto" latinLnBrk="0" hangingPunct="1">
+              <a:lnSpc>
+                <a:spcPct val="150000"/>
               </a:lnSpc>
               <a:spcBef>
                 <a:spcPts val="0"/>
@@ -11167,9 +11199,9 @@
             <a:endParaRPr lang="en-US" sz="1600"/>
           </a:p>
           <a:p>
-            <a:pPr marL="914400" lvl="1" indent="-342900" algn="l" rtl="0">
-              <a:lnSpc>
-                <a:spcPct val="115000"/>
+            <a:pPr marL="914400" lvl="1" indent="-342900" algn="l" rtl="0" eaLnBrk="1" fontAlgn="auto" latinLnBrk="0" hangingPunct="1">
+              <a:lnSpc>
+                <a:spcPct val="150000"/>
               </a:lnSpc>
               <a:spcBef>
                 <a:spcPts val="0"/>
@@ -11187,9 +11219,9 @@
             <a:endParaRPr lang="en-US" sz="1600"/>
           </a:p>
           <a:p>
-            <a:pPr marL="914400" lvl="1" indent="-342900" algn="l" rtl="0">
-              <a:lnSpc>
-                <a:spcPct val="115000"/>
+            <a:pPr marL="914400" lvl="1" indent="-342900" algn="l" rtl="0" eaLnBrk="1" fontAlgn="auto" latinLnBrk="0" hangingPunct="1">
+              <a:lnSpc>
+                <a:spcPct val="150000"/>
               </a:lnSpc>
               <a:spcBef>
                 <a:spcPts val="0"/>
@@ -11203,6 +11235,26 @@
             <a:r>
               <a:rPr lang="en-US" sz="1600"/>
               <a:t>Optimization of the front-end UI</a:t>
+            </a:r>
+            <a:endParaRPr lang="en-US" sz="1600"/>
+          </a:p>
+          <a:p>
+            <a:pPr marL="914400" lvl="1" indent="-342900" algn="l" rtl="0" eaLnBrk="1" fontAlgn="auto" latinLnBrk="0" hangingPunct="1">
+              <a:lnSpc>
+                <a:spcPct val="150000"/>
+              </a:lnSpc>
+              <a:spcBef>
+                <a:spcPts val="0"/>
+              </a:spcBef>
+              <a:spcAft>
+                <a:spcPts val="0"/>
+              </a:spcAft>
+              <a:buSzPts val="1800"/>
+              <a:buChar char="○"/>
+            </a:pPr>
+            <a:r>
+              <a:rPr lang="en-US" sz="1600"/>
+              <a:t>Log system</a:t>
             </a:r>
             <a:endParaRPr lang="en-US" sz="1600"/>
           </a:p>

</xml_diff>